<commit_message>
Commented some Code and Worked on Presentation
</commit_message>
<xml_diff>
--- a/VR Presentation.pptx
+++ b/VR Presentation.pptx
@@ -7,10 +7,14 @@
   <p:sldIdLst>
     <p:sldId id="256" r:id="rId2"/>
     <p:sldId id="257" r:id="rId3"/>
-    <p:sldId id="259" r:id="rId4"/>
-    <p:sldId id="260" r:id="rId5"/>
-    <p:sldId id="262" r:id="rId6"/>
-    <p:sldId id="258" r:id="rId7"/>
+    <p:sldId id="263" r:id="rId4"/>
+    <p:sldId id="264" r:id="rId5"/>
+    <p:sldId id="259" r:id="rId6"/>
+    <p:sldId id="265" r:id="rId7"/>
+    <p:sldId id="260" r:id="rId8"/>
+    <p:sldId id="262" r:id="rId9"/>
+    <p:sldId id="258" r:id="rId10"/>
+    <p:sldId id="266" r:id="rId11"/>
   </p:sldIdLst>
   <p:sldSz cx="12192000" cy="6858000"/>
   <p:notesSz cx="6858000" cy="9144000"/>
@@ -1401,7 +1405,7 @@
           <a:noFill/>
           <a:extLst>
             <a:ext uri="{909E8E84-426E-40dd-AFC4-6F175D3DCCD1}">
-              <a14:hiddenFill xmlns="" xmlns:a14="http://schemas.microsoft.com/office/drawing/2010/main">
+              <a14:hiddenFill xmlns:a14="http://schemas.microsoft.com/office/drawing/2010/main" xmlns="">
                 <a:solidFill>
                   <a:srgbClr val="FFFFFF"/>
                 </a:solidFill>
@@ -1461,7 +1465,7 @@
             </a:ln>
             <a:extLst>
               <a:ext uri="{91240B29-F687-4f45-9708-019B960494DF}">
-                <a14:hiddenLine xmlns="" xmlns:a14="http://schemas.microsoft.com/office/drawing/2010/main" w="9525">
+                <a14:hiddenLine xmlns:a14="http://schemas.microsoft.com/office/drawing/2010/main" xmlns="" w="9525">
                   <a:solidFill>
                     <a:srgbClr val="000000"/>
                   </a:solidFill>
@@ -1551,7 +1555,7 @@
             </a:ln>
             <a:extLst>
               <a:ext uri="{91240B29-F687-4f45-9708-019B960494DF}">
-                <a14:hiddenLine xmlns="" xmlns:a14="http://schemas.microsoft.com/office/drawing/2010/main" w="9525">
+                <a14:hiddenLine xmlns:a14="http://schemas.microsoft.com/office/drawing/2010/main" xmlns="" w="9525">
                   <a:solidFill>
                     <a:srgbClr val="000000"/>
                   </a:solidFill>
@@ -1641,7 +1645,7 @@
             </a:ln>
             <a:extLst>
               <a:ext uri="{91240B29-F687-4f45-9708-019B960494DF}">
-                <a14:hiddenLine xmlns="" xmlns:a14="http://schemas.microsoft.com/office/drawing/2010/main" w="9525">
+                <a14:hiddenLine xmlns:a14="http://schemas.microsoft.com/office/drawing/2010/main" xmlns="" w="9525">
                   <a:solidFill>
                     <a:srgbClr val="000000"/>
                   </a:solidFill>
@@ -1675,7 +1679,7 @@
             </a:ln>
             <a:extLst>
               <a:ext uri="{91240B29-F687-4f45-9708-019B960494DF}">
-                <a14:hiddenLine xmlns="" xmlns:a14="http://schemas.microsoft.com/office/drawing/2010/main" w="9525">
+                <a14:hiddenLine xmlns:a14="http://schemas.microsoft.com/office/drawing/2010/main" xmlns="" w="9525">
                   <a:solidFill>
                     <a:srgbClr val="000000"/>
                   </a:solidFill>
@@ -1765,7 +1769,7 @@
             </a:ln>
             <a:extLst>
               <a:ext uri="{91240B29-F687-4f45-9708-019B960494DF}">
-                <a14:hiddenLine xmlns="" xmlns:a14="http://schemas.microsoft.com/office/drawing/2010/main" w="9525">
+                <a14:hiddenLine xmlns:a14="http://schemas.microsoft.com/office/drawing/2010/main" xmlns="" w="9525">
                   <a:solidFill>
                     <a:srgbClr val="000000"/>
                   </a:solidFill>
@@ -1827,7 +1831,7 @@
             </a:ln>
             <a:extLst>
               <a:ext uri="{91240B29-F687-4f45-9708-019B960494DF}">
-                <a14:hiddenLine xmlns="" xmlns:a14="http://schemas.microsoft.com/office/drawing/2010/main" w="9525">
+                <a14:hiddenLine xmlns:a14="http://schemas.microsoft.com/office/drawing/2010/main" xmlns="" w="9525">
                   <a:solidFill>
                     <a:srgbClr val="000000"/>
                   </a:solidFill>
@@ -1889,7 +1893,7 @@
             </a:ln>
             <a:extLst>
               <a:ext uri="{91240B29-F687-4f45-9708-019B960494DF}">
-                <a14:hiddenLine xmlns="" xmlns:a14="http://schemas.microsoft.com/office/drawing/2010/main" w="9525">
+                <a14:hiddenLine xmlns:a14="http://schemas.microsoft.com/office/drawing/2010/main" xmlns="" w="9525">
                   <a:solidFill>
                     <a:srgbClr val="000000"/>
                   </a:solidFill>
@@ -1979,7 +1983,7 @@
             </a:ln>
             <a:extLst>
               <a:ext uri="{91240B29-F687-4f45-9708-019B960494DF}">
-                <a14:hiddenLine xmlns="" xmlns:a14="http://schemas.microsoft.com/office/drawing/2010/main" w="9525">
+                <a14:hiddenLine xmlns:a14="http://schemas.microsoft.com/office/drawing/2010/main" xmlns="" w="9525">
                   <a:solidFill>
                     <a:srgbClr val="000000"/>
                   </a:solidFill>
@@ -2041,7 +2045,7 @@
             </a:ln>
             <a:extLst>
               <a:ext uri="{91240B29-F687-4f45-9708-019B960494DF}">
-                <a14:hiddenLine xmlns="" xmlns:a14="http://schemas.microsoft.com/office/drawing/2010/main" w="9525">
+                <a14:hiddenLine xmlns:a14="http://schemas.microsoft.com/office/drawing/2010/main" xmlns="" w="9525">
                   <a:solidFill>
                     <a:srgbClr val="000000"/>
                   </a:solidFill>
@@ -2103,7 +2107,7 @@
             </a:ln>
             <a:extLst>
               <a:ext uri="{91240B29-F687-4f45-9708-019B960494DF}">
-                <a14:hiddenLine xmlns="" xmlns:a14="http://schemas.microsoft.com/office/drawing/2010/main" w="9525">
+                <a14:hiddenLine xmlns:a14="http://schemas.microsoft.com/office/drawing/2010/main" xmlns="" w="9525">
                   <a:solidFill>
                     <a:srgbClr val="000000"/>
                   </a:solidFill>
@@ -2193,7 +2197,7 @@
             </a:ln>
             <a:extLst>
               <a:ext uri="{91240B29-F687-4f45-9708-019B960494DF}">
-                <a14:hiddenLine xmlns="" xmlns:a14="http://schemas.microsoft.com/office/drawing/2010/main" w="9525">
+                <a14:hiddenLine xmlns:a14="http://schemas.microsoft.com/office/drawing/2010/main" xmlns="" w="9525">
                   <a:solidFill>
                     <a:srgbClr val="000000"/>
                   </a:solidFill>
@@ -2283,7 +2287,7 @@
             </a:ln>
             <a:extLst>
               <a:ext uri="{91240B29-F687-4f45-9708-019B960494DF}">
-                <a14:hiddenLine xmlns="" xmlns:a14="http://schemas.microsoft.com/office/drawing/2010/main" w="9525">
+                <a14:hiddenLine xmlns:a14="http://schemas.microsoft.com/office/drawing/2010/main" xmlns="" w="9525">
                   <a:solidFill>
                     <a:srgbClr val="000000"/>
                   </a:solidFill>
@@ -2345,7 +2349,7 @@
             </a:ln>
             <a:extLst>
               <a:ext uri="{91240B29-F687-4f45-9708-019B960494DF}">
-                <a14:hiddenLine xmlns="" xmlns:a14="http://schemas.microsoft.com/office/drawing/2010/main" w="9525">
+                <a14:hiddenLine xmlns:a14="http://schemas.microsoft.com/office/drawing/2010/main" xmlns="" w="9525">
                   <a:solidFill>
                     <a:srgbClr val="000000"/>
                   </a:solidFill>
@@ -2455,7 +2459,7 @@
             </a:ln>
             <a:extLst>
               <a:ext uri="{91240B29-F687-4f45-9708-019B960494DF}">
-                <a14:hiddenLine xmlns="" xmlns:a14="http://schemas.microsoft.com/office/drawing/2010/main" w="9525">
+                <a14:hiddenLine xmlns:a14="http://schemas.microsoft.com/office/drawing/2010/main" xmlns="" w="9525">
                   <a:solidFill>
                     <a:srgbClr val="000000"/>
                   </a:solidFill>
@@ -2517,7 +2521,7 @@
             </a:ln>
             <a:extLst>
               <a:ext uri="{91240B29-F687-4f45-9708-019B960494DF}">
-                <a14:hiddenLine xmlns="" xmlns:a14="http://schemas.microsoft.com/office/drawing/2010/main" w="9525">
+                <a14:hiddenLine xmlns:a14="http://schemas.microsoft.com/office/drawing/2010/main" xmlns="" w="9525">
                   <a:solidFill>
                     <a:srgbClr val="000000"/>
                   </a:solidFill>
@@ -2607,7 +2611,7 @@
             </a:ln>
             <a:extLst>
               <a:ext uri="{91240B29-F687-4f45-9708-019B960494DF}">
-                <a14:hiddenLine xmlns="" xmlns:a14="http://schemas.microsoft.com/office/drawing/2010/main" w="9525">
+                <a14:hiddenLine xmlns:a14="http://schemas.microsoft.com/office/drawing/2010/main" xmlns="" w="9525">
                   <a:solidFill>
                     <a:srgbClr val="000000"/>
                   </a:solidFill>
@@ -2697,7 +2701,7 @@
             </a:ln>
             <a:extLst>
               <a:ext uri="{91240B29-F687-4f45-9708-019B960494DF}">
-                <a14:hiddenLine xmlns="" xmlns:a14="http://schemas.microsoft.com/office/drawing/2010/main" w="9525">
+                <a14:hiddenLine xmlns:a14="http://schemas.microsoft.com/office/drawing/2010/main" xmlns="" w="9525">
                   <a:solidFill>
                     <a:srgbClr val="000000"/>
                   </a:solidFill>
@@ -2759,7 +2763,7 @@
             </a:ln>
             <a:extLst>
               <a:ext uri="{91240B29-F687-4f45-9708-019B960494DF}">
-                <a14:hiddenLine xmlns="" xmlns:a14="http://schemas.microsoft.com/office/drawing/2010/main" w="9525">
+                <a14:hiddenLine xmlns:a14="http://schemas.microsoft.com/office/drawing/2010/main" xmlns="" w="9525">
                   <a:solidFill>
                     <a:srgbClr val="000000"/>
                   </a:solidFill>
@@ -2849,7 +2853,7 @@
             </a:ln>
             <a:extLst>
               <a:ext uri="{91240B29-F687-4f45-9708-019B960494DF}">
-                <a14:hiddenLine xmlns="" xmlns:a14="http://schemas.microsoft.com/office/drawing/2010/main" w="9525">
+                <a14:hiddenLine xmlns:a14="http://schemas.microsoft.com/office/drawing/2010/main" xmlns="" w="9525">
                   <a:solidFill>
                     <a:srgbClr val="000000"/>
                   </a:solidFill>
@@ -2939,7 +2943,7 @@
             </a:ln>
             <a:extLst>
               <a:ext uri="{91240B29-F687-4f45-9708-019B960494DF}">
-                <a14:hiddenLine xmlns="" xmlns:a14="http://schemas.microsoft.com/office/drawing/2010/main" w="9525">
+                <a14:hiddenLine xmlns:a14="http://schemas.microsoft.com/office/drawing/2010/main" xmlns="" w="9525">
                   <a:solidFill>
                     <a:srgbClr val="000000"/>
                   </a:solidFill>
@@ -2995,7 +2999,7 @@
             </a:ln>
             <a:extLst>
               <a:ext uri="{91240B29-F687-4f45-9708-019B960494DF}">
-                <a14:hiddenLine xmlns="" xmlns:a14="http://schemas.microsoft.com/office/drawing/2010/main" w="9525">
+                <a14:hiddenLine xmlns:a14="http://schemas.microsoft.com/office/drawing/2010/main" xmlns="" w="9525">
                   <a:solidFill>
                     <a:srgbClr val="000000"/>
                   </a:solidFill>
@@ -3085,7 +3089,7 @@
             </a:ln>
             <a:extLst>
               <a:ext uri="{91240B29-F687-4f45-9708-019B960494DF}">
-                <a14:hiddenLine xmlns="" xmlns:a14="http://schemas.microsoft.com/office/drawing/2010/main" w="9525">
+                <a14:hiddenLine xmlns:a14="http://schemas.microsoft.com/office/drawing/2010/main" xmlns="" w="9525">
                   <a:solidFill>
                     <a:srgbClr val="000000"/>
                   </a:solidFill>
@@ -3141,7 +3145,7 @@
             </a:ln>
             <a:extLst>
               <a:ext uri="{91240B29-F687-4f45-9708-019B960494DF}">
-                <a14:hiddenLine xmlns="" xmlns:a14="http://schemas.microsoft.com/office/drawing/2010/main" w="9525">
+                <a14:hiddenLine xmlns:a14="http://schemas.microsoft.com/office/drawing/2010/main" xmlns="" w="9525">
                   <a:solidFill>
                     <a:srgbClr val="000000"/>
                   </a:solidFill>
@@ -3231,7 +3235,7 @@
             </a:ln>
             <a:extLst>
               <a:ext uri="{91240B29-F687-4f45-9708-019B960494DF}">
-                <a14:hiddenLine xmlns="" xmlns:a14="http://schemas.microsoft.com/office/drawing/2010/main" w="9525">
+                <a14:hiddenLine xmlns:a14="http://schemas.microsoft.com/office/drawing/2010/main" xmlns="" w="9525">
                   <a:solidFill>
                     <a:srgbClr val="000000"/>
                   </a:solidFill>
@@ -3299,7 +3303,7 @@
             </a:ln>
             <a:extLst>
               <a:ext uri="{91240B29-F687-4f45-9708-019B960494DF}">
-                <a14:hiddenLine xmlns="" xmlns:a14="http://schemas.microsoft.com/office/drawing/2010/main" w="9525">
+                <a14:hiddenLine xmlns:a14="http://schemas.microsoft.com/office/drawing/2010/main" xmlns="" w="9525">
                   <a:solidFill>
                     <a:srgbClr val="000000"/>
                   </a:solidFill>
@@ -3389,7 +3393,7 @@
             </a:ln>
             <a:extLst>
               <a:ext uri="{91240B29-F687-4f45-9708-019B960494DF}">
-                <a14:hiddenLine xmlns="" xmlns:a14="http://schemas.microsoft.com/office/drawing/2010/main" w="9525">
+                <a14:hiddenLine xmlns:a14="http://schemas.microsoft.com/office/drawing/2010/main" xmlns="" w="9525">
                   <a:solidFill>
                     <a:srgbClr val="000000"/>
                   </a:solidFill>
@@ -3457,7 +3461,7 @@
             </a:ln>
             <a:extLst>
               <a:ext uri="{91240B29-F687-4f45-9708-019B960494DF}">
-                <a14:hiddenLine xmlns="" xmlns:a14="http://schemas.microsoft.com/office/drawing/2010/main" w="9525">
+                <a14:hiddenLine xmlns:a14="http://schemas.microsoft.com/office/drawing/2010/main" xmlns="" w="9525">
                   <a:solidFill>
                     <a:srgbClr val="000000"/>
                   </a:solidFill>
@@ -3547,7 +3551,7 @@
             </a:ln>
             <a:extLst>
               <a:ext uri="{91240B29-F687-4f45-9708-019B960494DF}">
-                <a14:hiddenLine xmlns="" xmlns:a14="http://schemas.microsoft.com/office/drawing/2010/main" w="9525">
+                <a14:hiddenLine xmlns:a14="http://schemas.microsoft.com/office/drawing/2010/main" xmlns="" w="9525">
                   <a:solidFill>
                     <a:srgbClr val="000000"/>
                   </a:solidFill>
@@ -3581,7 +3585,7 @@
             </a:ln>
             <a:extLst>
               <a:ext uri="{91240B29-F687-4f45-9708-019B960494DF}">
-                <a14:hiddenLine xmlns="" xmlns:a14="http://schemas.microsoft.com/office/drawing/2010/main" w="9525">
+                <a14:hiddenLine xmlns:a14="http://schemas.microsoft.com/office/drawing/2010/main" xmlns="" w="9525">
                   <a:solidFill>
                     <a:srgbClr val="000000"/>
                   </a:solidFill>
@@ -3671,7 +3675,7 @@
             </a:ln>
             <a:extLst>
               <a:ext uri="{91240B29-F687-4f45-9708-019B960494DF}">
-                <a14:hiddenLine xmlns="" xmlns:a14="http://schemas.microsoft.com/office/drawing/2010/main" w="9525">
+                <a14:hiddenLine xmlns:a14="http://schemas.microsoft.com/office/drawing/2010/main" xmlns="" w="9525">
                   <a:solidFill>
                     <a:srgbClr val="000000"/>
                   </a:solidFill>
@@ -3733,7 +3737,7 @@
             </a:ln>
             <a:extLst>
               <a:ext uri="{91240B29-F687-4f45-9708-019B960494DF}">
-                <a14:hiddenLine xmlns="" xmlns:a14="http://schemas.microsoft.com/office/drawing/2010/main" w="9525">
+                <a14:hiddenLine xmlns:a14="http://schemas.microsoft.com/office/drawing/2010/main" xmlns="" w="9525">
                   <a:solidFill>
                     <a:srgbClr val="000000"/>
                   </a:solidFill>
@@ -3795,7 +3799,7 @@
             </a:ln>
             <a:extLst>
               <a:ext uri="{91240B29-F687-4f45-9708-019B960494DF}">
-                <a14:hiddenLine xmlns="" xmlns:a14="http://schemas.microsoft.com/office/drawing/2010/main" w="9525">
+                <a14:hiddenLine xmlns:a14="http://schemas.microsoft.com/office/drawing/2010/main" xmlns="" w="9525">
                   <a:solidFill>
                     <a:srgbClr val="000000"/>
                   </a:solidFill>
@@ -3885,7 +3889,7 @@
             </a:ln>
             <a:extLst>
               <a:ext uri="{91240B29-F687-4f45-9708-019B960494DF}">
-                <a14:hiddenLine xmlns="" xmlns:a14="http://schemas.microsoft.com/office/drawing/2010/main" w="9525">
+                <a14:hiddenLine xmlns:a14="http://schemas.microsoft.com/office/drawing/2010/main" xmlns="" w="9525">
                   <a:solidFill>
                     <a:srgbClr val="000000"/>
                   </a:solidFill>
@@ -3953,7 +3957,7 @@
             </a:ln>
             <a:extLst>
               <a:ext uri="{91240B29-F687-4f45-9708-019B960494DF}">
-                <a14:hiddenLine xmlns="" xmlns:a14="http://schemas.microsoft.com/office/drawing/2010/main" w="9525">
+                <a14:hiddenLine xmlns:a14="http://schemas.microsoft.com/office/drawing/2010/main" xmlns="" w="9525">
                   <a:solidFill>
                     <a:srgbClr val="000000"/>
                   </a:solidFill>
@@ -4015,7 +4019,7 @@
             </a:ln>
             <a:extLst>
               <a:ext uri="{91240B29-F687-4f45-9708-019B960494DF}">
-                <a14:hiddenLine xmlns="" xmlns:a14="http://schemas.microsoft.com/office/drawing/2010/main" w="9525">
+                <a14:hiddenLine xmlns:a14="http://schemas.microsoft.com/office/drawing/2010/main" xmlns="" w="9525">
                   <a:solidFill>
                     <a:srgbClr val="000000"/>
                   </a:solidFill>
@@ -4105,7 +4109,7 @@
             </a:ln>
             <a:extLst>
               <a:ext uri="{91240B29-F687-4f45-9708-019B960494DF}">
-                <a14:hiddenLine xmlns="" xmlns:a14="http://schemas.microsoft.com/office/drawing/2010/main" w="9525">
+                <a14:hiddenLine xmlns:a14="http://schemas.microsoft.com/office/drawing/2010/main" xmlns="" w="9525">
                   <a:solidFill>
                     <a:srgbClr val="000000"/>
                   </a:solidFill>
@@ -4167,7 +4171,7 @@
             </a:ln>
             <a:extLst>
               <a:ext uri="{91240B29-F687-4f45-9708-019B960494DF}">
-                <a14:hiddenLine xmlns="" xmlns:a14="http://schemas.microsoft.com/office/drawing/2010/main" w="9525">
+                <a14:hiddenLine xmlns:a14="http://schemas.microsoft.com/office/drawing/2010/main" xmlns="" w="9525">
                   <a:solidFill>
                     <a:srgbClr val="000000"/>
                   </a:solidFill>
@@ -4257,7 +4261,7 @@
             </a:ln>
             <a:extLst>
               <a:ext uri="{91240B29-F687-4f45-9708-019B960494DF}">
-                <a14:hiddenLine xmlns="" xmlns:a14="http://schemas.microsoft.com/office/drawing/2010/main" w="9525">
+                <a14:hiddenLine xmlns:a14="http://schemas.microsoft.com/office/drawing/2010/main" xmlns="" w="9525">
                   <a:solidFill>
                     <a:srgbClr val="000000"/>
                   </a:solidFill>
@@ -4319,7 +4323,7 @@
             </a:ln>
             <a:extLst>
               <a:ext uri="{91240B29-F687-4f45-9708-019B960494DF}">
-                <a14:hiddenLine xmlns="" xmlns:a14="http://schemas.microsoft.com/office/drawing/2010/main" w="9525">
+                <a14:hiddenLine xmlns:a14="http://schemas.microsoft.com/office/drawing/2010/main" xmlns="" w="9525">
                   <a:solidFill>
                     <a:srgbClr val="000000"/>
                   </a:solidFill>
@@ -4409,7 +4413,7 @@
             </a:ln>
             <a:extLst>
               <a:ext uri="{91240B29-F687-4f45-9708-019B960494DF}">
-                <a14:hiddenLine xmlns="" xmlns:a14="http://schemas.microsoft.com/office/drawing/2010/main" w="9525">
+                <a14:hiddenLine xmlns:a14="http://schemas.microsoft.com/office/drawing/2010/main" xmlns="" w="9525">
                   <a:solidFill>
                     <a:srgbClr val="000000"/>
                   </a:solidFill>
@@ -4443,7 +4447,7 @@
             </a:ln>
             <a:extLst>
               <a:ext uri="{91240B29-F687-4f45-9708-019B960494DF}">
-                <a14:hiddenLine xmlns="" xmlns:a14="http://schemas.microsoft.com/office/drawing/2010/main" w="9525">
+                <a14:hiddenLine xmlns:a14="http://schemas.microsoft.com/office/drawing/2010/main" xmlns="" w="9525">
                   <a:solidFill>
                     <a:srgbClr val="000000"/>
                   </a:solidFill>
@@ -4508,7 +4512,7 @@
             </a:ln>
             <a:extLst>
               <a:ext uri="{91240B29-F687-4f45-9708-019B960494DF}">
-                <a14:hiddenLine xmlns="" xmlns:a14="http://schemas.microsoft.com/office/drawing/2010/main" w="9525">
+                <a14:hiddenLine xmlns:a14="http://schemas.microsoft.com/office/drawing/2010/main" xmlns="" w="9525">
                   <a:solidFill>
                     <a:srgbClr val="000000"/>
                   </a:solidFill>
@@ -4598,7 +4602,7 @@
             </a:ln>
             <a:extLst>
               <a:ext uri="{91240B29-F687-4f45-9708-019B960494DF}">
-                <a14:hiddenLine xmlns="" xmlns:a14="http://schemas.microsoft.com/office/drawing/2010/main" w="9525">
+                <a14:hiddenLine xmlns:a14="http://schemas.microsoft.com/office/drawing/2010/main" xmlns="" w="9525">
                   <a:solidFill>
                     <a:srgbClr val="000000"/>
                   </a:solidFill>
@@ -4660,7 +4664,7 @@
             </a:ln>
             <a:extLst>
               <a:ext uri="{91240B29-F687-4f45-9708-019B960494DF}">
-                <a14:hiddenLine xmlns="" xmlns:a14="http://schemas.microsoft.com/office/drawing/2010/main" w="9525">
+                <a14:hiddenLine xmlns:a14="http://schemas.microsoft.com/office/drawing/2010/main" xmlns="" w="9525">
                   <a:solidFill>
                     <a:srgbClr val="000000"/>
                   </a:solidFill>
@@ -4750,7 +4754,7 @@
             </a:ln>
             <a:extLst>
               <a:ext uri="{91240B29-F687-4f45-9708-019B960494DF}">
-                <a14:hiddenLine xmlns="" xmlns:a14="http://schemas.microsoft.com/office/drawing/2010/main" w="9525">
+                <a14:hiddenLine xmlns:a14="http://schemas.microsoft.com/office/drawing/2010/main" xmlns="" w="9525">
                   <a:solidFill>
                     <a:srgbClr val="000000"/>
                   </a:solidFill>
@@ -4840,7 +4844,7 @@
             </a:ln>
             <a:extLst>
               <a:ext uri="{91240B29-F687-4f45-9708-019B960494DF}">
-                <a14:hiddenLine xmlns="" xmlns:a14="http://schemas.microsoft.com/office/drawing/2010/main" w="9525">
+                <a14:hiddenLine xmlns:a14="http://schemas.microsoft.com/office/drawing/2010/main" xmlns="" w="9525">
                   <a:solidFill>
                     <a:srgbClr val="000000"/>
                   </a:solidFill>
@@ -4905,7 +4909,7 @@
             </a:ln>
             <a:extLst>
               <a:ext uri="{91240B29-F687-4f45-9708-019B960494DF}">
-                <a14:hiddenLine xmlns="" xmlns:a14="http://schemas.microsoft.com/office/drawing/2010/main" w="9525">
+                <a14:hiddenLine xmlns:a14="http://schemas.microsoft.com/office/drawing/2010/main" xmlns="" w="9525">
                   <a:solidFill>
                     <a:srgbClr val="000000"/>
                   </a:solidFill>
@@ -4967,7 +4971,7 @@
             </a:ln>
             <a:extLst>
               <a:ext uri="{91240B29-F687-4f45-9708-019B960494DF}">
-                <a14:hiddenLine xmlns="" xmlns:a14="http://schemas.microsoft.com/office/drawing/2010/main" w="9525">
+                <a14:hiddenLine xmlns:a14="http://schemas.microsoft.com/office/drawing/2010/main" xmlns="" w="9525">
                   <a:solidFill>
                     <a:srgbClr val="000000"/>
                   </a:solidFill>
@@ -5057,7 +5061,7 @@
             </a:ln>
             <a:extLst>
               <a:ext uri="{91240B29-F687-4f45-9708-019B960494DF}">
-                <a14:hiddenLine xmlns="" xmlns:a14="http://schemas.microsoft.com/office/drawing/2010/main" w="9525">
+                <a14:hiddenLine xmlns:a14="http://schemas.microsoft.com/office/drawing/2010/main" xmlns="" w="9525">
                   <a:solidFill>
                     <a:srgbClr val="000000"/>
                   </a:solidFill>
@@ -5147,7 +5151,7 @@
             </a:ln>
             <a:extLst>
               <a:ext uri="{91240B29-F687-4f45-9708-019B960494DF}">
-                <a14:hiddenLine xmlns="" xmlns:a14="http://schemas.microsoft.com/office/drawing/2010/main" w="9525">
+                <a14:hiddenLine xmlns:a14="http://schemas.microsoft.com/office/drawing/2010/main" xmlns="" w="9525">
                   <a:solidFill>
                     <a:srgbClr val="000000"/>
                   </a:solidFill>
@@ -5209,7 +5213,7 @@
             </a:ln>
             <a:extLst>
               <a:ext uri="{91240B29-F687-4f45-9708-019B960494DF}">
-                <a14:hiddenLine xmlns="" xmlns:a14="http://schemas.microsoft.com/office/drawing/2010/main" w="9525">
+                <a14:hiddenLine xmlns:a14="http://schemas.microsoft.com/office/drawing/2010/main" xmlns="" w="9525">
                   <a:solidFill>
                     <a:srgbClr val="000000"/>
                   </a:solidFill>
@@ -5329,7 +5333,7 @@
             </a:ln>
             <a:extLst>
               <a:ext uri="{91240B29-F687-4f45-9708-019B960494DF}">
-                <a14:hiddenLine xmlns="" xmlns:a14="http://schemas.microsoft.com/office/drawing/2010/main" w="9525">
+                <a14:hiddenLine xmlns:a14="http://schemas.microsoft.com/office/drawing/2010/main" xmlns="" w="9525">
                   <a:solidFill>
                     <a:srgbClr val="000000"/>
                   </a:solidFill>
@@ -5397,7 +5401,7 @@
             </a:ln>
             <a:extLst>
               <a:ext uri="{91240B29-F687-4f45-9708-019B960494DF}">
-                <a14:hiddenLine xmlns="" xmlns:a14="http://schemas.microsoft.com/office/drawing/2010/main" w="9525">
+                <a14:hiddenLine xmlns:a14="http://schemas.microsoft.com/office/drawing/2010/main" xmlns="" w="9525">
                   <a:solidFill>
                     <a:srgbClr val="000000"/>
                   </a:solidFill>
@@ -5487,7 +5491,7 @@
             </a:ln>
             <a:extLst>
               <a:ext uri="{91240B29-F687-4f45-9708-019B960494DF}">
-                <a14:hiddenLine xmlns="" xmlns:a14="http://schemas.microsoft.com/office/drawing/2010/main" w="9525">
+                <a14:hiddenLine xmlns:a14="http://schemas.microsoft.com/office/drawing/2010/main" xmlns="" w="9525">
                   <a:solidFill>
                     <a:srgbClr val="000000"/>
                   </a:solidFill>
@@ -10209,7 +10213,7 @@
           <a:noFill/>
           <a:extLst>
             <a:ext uri="{909E8E84-426E-40dd-AFC4-6F175D3DCCD1}">
-              <a14:hiddenFill xmlns="" xmlns:a14="http://schemas.microsoft.com/office/drawing/2010/main">
+              <a14:hiddenFill xmlns:a14="http://schemas.microsoft.com/office/drawing/2010/main" xmlns="">
                 <a:solidFill>
                   <a:srgbClr val="FFFFFF"/>
                 </a:solidFill>
@@ -10283,7 +10287,7 @@
               </a:ln>
               <a:extLst>
                 <a:ext uri="{91240B29-F687-4f45-9708-019B960494DF}">
-                  <a14:hiddenLine xmlns="" xmlns:a14="http://schemas.microsoft.com/office/drawing/2010/main" w="9525">
+                  <a14:hiddenLine xmlns:a14="http://schemas.microsoft.com/office/drawing/2010/main" xmlns="" w="9525">
                     <a:solidFill>
                       <a:srgbClr val="000000"/>
                     </a:solidFill>
@@ -10373,7 +10377,7 @@
               </a:ln>
               <a:extLst>
                 <a:ext uri="{91240B29-F687-4f45-9708-019B960494DF}">
-                  <a14:hiddenLine xmlns="" xmlns:a14="http://schemas.microsoft.com/office/drawing/2010/main" w="9525">
+                  <a14:hiddenLine xmlns:a14="http://schemas.microsoft.com/office/drawing/2010/main" xmlns="" w="9525">
                     <a:solidFill>
                       <a:srgbClr val="000000"/>
                     </a:solidFill>
@@ -10463,7 +10467,7 @@
               </a:ln>
               <a:extLst>
                 <a:ext uri="{91240B29-F687-4f45-9708-019B960494DF}">
-                  <a14:hiddenLine xmlns="" xmlns:a14="http://schemas.microsoft.com/office/drawing/2010/main" w="9525">
+                  <a14:hiddenLine xmlns:a14="http://schemas.microsoft.com/office/drawing/2010/main" xmlns="" w="9525">
                     <a:solidFill>
                       <a:srgbClr val="000000"/>
                     </a:solidFill>
@@ -10525,7 +10529,7 @@
               </a:ln>
               <a:extLst>
                 <a:ext uri="{91240B29-F687-4f45-9708-019B960494DF}">
-                  <a14:hiddenLine xmlns="" xmlns:a14="http://schemas.microsoft.com/office/drawing/2010/main" w="9525">
+                  <a14:hiddenLine xmlns:a14="http://schemas.microsoft.com/office/drawing/2010/main" xmlns="" w="9525">
                     <a:solidFill>
                       <a:srgbClr val="000000"/>
                     </a:solidFill>
@@ -10615,7 +10619,7 @@
               </a:ln>
               <a:extLst>
                 <a:ext uri="{91240B29-F687-4f45-9708-019B960494DF}">
-                  <a14:hiddenLine xmlns="" xmlns:a14="http://schemas.microsoft.com/office/drawing/2010/main" w="9525">
+                  <a14:hiddenLine xmlns:a14="http://schemas.microsoft.com/office/drawing/2010/main" xmlns="" w="9525">
                     <a:solidFill>
                       <a:srgbClr val="000000"/>
                     </a:solidFill>
@@ -10677,7 +10681,7 @@
               </a:ln>
               <a:extLst>
                 <a:ext uri="{91240B29-F687-4f45-9708-019B960494DF}">
-                  <a14:hiddenLine xmlns="" xmlns:a14="http://schemas.microsoft.com/office/drawing/2010/main" w="9525">
+                  <a14:hiddenLine xmlns:a14="http://schemas.microsoft.com/office/drawing/2010/main" xmlns="" w="9525">
                     <a:solidFill>
                       <a:srgbClr val="000000"/>
                     </a:solidFill>
@@ -10739,7 +10743,7 @@
               </a:ln>
               <a:extLst>
                 <a:ext uri="{91240B29-F687-4f45-9708-019B960494DF}">
-                  <a14:hiddenLine xmlns="" xmlns:a14="http://schemas.microsoft.com/office/drawing/2010/main" w="9525">
+                  <a14:hiddenLine xmlns:a14="http://schemas.microsoft.com/office/drawing/2010/main" xmlns="" w="9525">
                     <a:solidFill>
                       <a:srgbClr val="000000"/>
                     </a:solidFill>
@@ -10829,7 +10833,7 @@
               </a:ln>
               <a:extLst>
                 <a:ext uri="{91240B29-F687-4f45-9708-019B960494DF}">
-                  <a14:hiddenLine xmlns="" xmlns:a14="http://schemas.microsoft.com/office/drawing/2010/main" w="9525">
+                  <a14:hiddenLine xmlns:a14="http://schemas.microsoft.com/office/drawing/2010/main" xmlns="" w="9525">
                     <a:solidFill>
                       <a:srgbClr val="000000"/>
                     </a:solidFill>
@@ -10919,7 +10923,7 @@
               </a:ln>
               <a:extLst>
                 <a:ext uri="{91240B29-F687-4f45-9708-019B960494DF}">
-                  <a14:hiddenLine xmlns="" xmlns:a14="http://schemas.microsoft.com/office/drawing/2010/main" w="9525">
+                  <a14:hiddenLine xmlns:a14="http://schemas.microsoft.com/office/drawing/2010/main" xmlns="" w="9525">
                     <a:solidFill>
                       <a:srgbClr val="000000"/>
                     </a:solidFill>
@@ -10981,7 +10985,7 @@
               </a:ln>
               <a:extLst>
                 <a:ext uri="{91240B29-F687-4f45-9708-019B960494DF}">
-                  <a14:hiddenLine xmlns="" xmlns:a14="http://schemas.microsoft.com/office/drawing/2010/main" w="9525">
+                  <a14:hiddenLine xmlns:a14="http://schemas.microsoft.com/office/drawing/2010/main" xmlns="" w="9525">
                     <a:solidFill>
                       <a:srgbClr val="000000"/>
                     </a:solidFill>
@@ -11091,7 +11095,7 @@
               </a:ln>
               <a:extLst>
                 <a:ext uri="{91240B29-F687-4f45-9708-019B960494DF}">
-                  <a14:hiddenLine xmlns="" xmlns:a14="http://schemas.microsoft.com/office/drawing/2010/main" w="9525">
+                  <a14:hiddenLine xmlns:a14="http://schemas.microsoft.com/office/drawing/2010/main" xmlns="" w="9525">
                     <a:solidFill>
                       <a:srgbClr val="000000"/>
                     </a:solidFill>
@@ -11175,7 +11179,7 @@
               </a:ln>
               <a:extLst>
                 <a:ext uri="{91240B29-F687-4f45-9708-019B960494DF}">
-                  <a14:hiddenLine xmlns="" xmlns:a14="http://schemas.microsoft.com/office/drawing/2010/main" w="9525">
+                  <a14:hiddenLine xmlns:a14="http://schemas.microsoft.com/office/drawing/2010/main" xmlns="" w="9525">
                     <a:solidFill>
                       <a:srgbClr val="000000"/>
                     </a:solidFill>
@@ -11237,7 +11241,7 @@
               </a:ln>
               <a:extLst>
                 <a:ext uri="{91240B29-F687-4f45-9708-019B960494DF}">
-                  <a14:hiddenLine xmlns="" xmlns:a14="http://schemas.microsoft.com/office/drawing/2010/main" w="9525">
+                  <a14:hiddenLine xmlns:a14="http://schemas.microsoft.com/office/drawing/2010/main" xmlns="" w="9525">
                     <a:solidFill>
                       <a:srgbClr val="000000"/>
                     </a:solidFill>
@@ -11299,7 +11303,7 @@
               </a:ln>
               <a:extLst>
                 <a:ext uri="{91240B29-F687-4f45-9708-019B960494DF}">
-                  <a14:hiddenLine xmlns="" xmlns:a14="http://schemas.microsoft.com/office/drawing/2010/main" w="9525">
+                  <a14:hiddenLine xmlns:a14="http://schemas.microsoft.com/office/drawing/2010/main" xmlns="" w="9525">
                     <a:solidFill>
                       <a:srgbClr val="000000"/>
                     </a:solidFill>
@@ -11389,7 +11393,7 @@
               </a:ln>
               <a:extLst>
                 <a:ext uri="{91240B29-F687-4f45-9708-019B960494DF}">
-                  <a14:hiddenLine xmlns="" xmlns:a14="http://schemas.microsoft.com/office/drawing/2010/main" w="9525">
+                  <a14:hiddenLine xmlns:a14="http://schemas.microsoft.com/office/drawing/2010/main" xmlns="" w="9525">
                     <a:solidFill>
                       <a:srgbClr val="000000"/>
                     </a:solidFill>
@@ -11423,7 +11427,7 @@
               </a:ln>
               <a:extLst>
                 <a:ext uri="{91240B29-F687-4f45-9708-019B960494DF}">
-                  <a14:hiddenLine xmlns="" xmlns:a14="http://schemas.microsoft.com/office/drawing/2010/main" w="9525">
+                  <a14:hiddenLine xmlns:a14="http://schemas.microsoft.com/office/drawing/2010/main" xmlns="" w="9525">
                     <a:solidFill>
                       <a:srgbClr val="000000"/>
                     </a:solidFill>
@@ -11488,7 +11492,7 @@
               </a:ln>
               <a:extLst>
                 <a:ext uri="{91240B29-F687-4f45-9708-019B960494DF}">
-                  <a14:hiddenLine xmlns="" xmlns:a14="http://schemas.microsoft.com/office/drawing/2010/main" w="9525">
+                  <a14:hiddenLine xmlns:a14="http://schemas.microsoft.com/office/drawing/2010/main" xmlns="" w="9525">
                     <a:solidFill>
                       <a:srgbClr val="000000"/>
                     </a:solidFill>
@@ -11578,7 +11582,7 @@
               </a:ln>
               <a:extLst>
                 <a:ext uri="{91240B29-F687-4f45-9708-019B960494DF}">
-                  <a14:hiddenLine xmlns="" xmlns:a14="http://schemas.microsoft.com/office/drawing/2010/main" w="9525">
+                  <a14:hiddenLine xmlns:a14="http://schemas.microsoft.com/office/drawing/2010/main" xmlns="" w="9525">
                     <a:solidFill>
                       <a:srgbClr val="000000"/>
                     </a:solidFill>
@@ -11640,7 +11644,7 @@
               </a:ln>
               <a:extLst>
                 <a:ext uri="{91240B29-F687-4f45-9708-019B960494DF}">
-                  <a14:hiddenLine xmlns="" xmlns:a14="http://schemas.microsoft.com/office/drawing/2010/main" w="9525">
+                  <a14:hiddenLine xmlns:a14="http://schemas.microsoft.com/office/drawing/2010/main" xmlns="" w="9525">
                     <a:solidFill>
                       <a:srgbClr val="000000"/>
                     </a:solidFill>
@@ -11730,7 +11734,7 @@
               </a:ln>
               <a:extLst>
                 <a:ext uri="{91240B29-F687-4f45-9708-019B960494DF}">
-                  <a14:hiddenLine xmlns="" xmlns:a14="http://schemas.microsoft.com/office/drawing/2010/main" w="9525">
+                  <a14:hiddenLine xmlns:a14="http://schemas.microsoft.com/office/drawing/2010/main" xmlns="" w="9525">
                     <a:solidFill>
                       <a:srgbClr val="000000"/>
                     </a:solidFill>
@@ -11795,7 +11799,7 @@
               </a:ln>
               <a:extLst>
                 <a:ext uri="{91240B29-F687-4f45-9708-019B960494DF}">
-                  <a14:hiddenLine xmlns="" xmlns:a14="http://schemas.microsoft.com/office/drawing/2010/main" w="9525">
+                  <a14:hiddenLine xmlns:a14="http://schemas.microsoft.com/office/drawing/2010/main" xmlns="" w="9525">
                     <a:solidFill>
                       <a:srgbClr val="000000"/>
                     </a:solidFill>
@@ -11857,7 +11861,7 @@
               </a:ln>
               <a:extLst>
                 <a:ext uri="{91240B29-F687-4f45-9708-019B960494DF}">
-                  <a14:hiddenLine xmlns="" xmlns:a14="http://schemas.microsoft.com/office/drawing/2010/main" w="9525">
+                  <a14:hiddenLine xmlns:a14="http://schemas.microsoft.com/office/drawing/2010/main" xmlns="" w="9525">
                     <a:solidFill>
                       <a:srgbClr val="000000"/>
                     </a:solidFill>
@@ -11947,7 +11951,7 @@
               </a:ln>
               <a:extLst>
                 <a:ext uri="{91240B29-F687-4f45-9708-019B960494DF}">
-                  <a14:hiddenLine xmlns="" xmlns:a14="http://schemas.microsoft.com/office/drawing/2010/main" w="9525">
+                  <a14:hiddenLine xmlns:a14="http://schemas.microsoft.com/office/drawing/2010/main" xmlns="" w="9525">
                     <a:solidFill>
                       <a:srgbClr val="000000"/>
                     </a:solidFill>
@@ -12037,7 +12041,7 @@
               </a:ln>
               <a:extLst>
                 <a:ext uri="{91240B29-F687-4f45-9708-019B960494DF}">
-                  <a14:hiddenLine xmlns="" xmlns:a14="http://schemas.microsoft.com/office/drawing/2010/main" w="9525">
+                  <a14:hiddenLine xmlns:a14="http://schemas.microsoft.com/office/drawing/2010/main" xmlns="" w="9525">
                     <a:solidFill>
                       <a:srgbClr val="000000"/>
                     </a:solidFill>
@@ -12102,7 +12106,7 @@
               </a:ln>
               <a:extLst>
                 <a:ext uri="{91240B29-F687-4f45-9708-019B960494DF}">
-                  <a14:hiddenLine xmlns="" xmlns:a14="http://schemas.microsoft.com/office/drawing/2010/main" w="9525">
+                  <a14:hiddenLine xmlns:a14="http://schemas.microsoft.com/office/drawing/2010/main" xmlns="" w="9525">
                     <a:solidFill>
                       <a:srgbClr val="000000"/>
                     </a:solidFill>
@@ -12222,7 +12226,7 @@
               </a:ln>
               <a:extLst>
                 <a:ext uri="{91240B29-F687-4f45-9708-019B960494DF}">
-                  <a14:hiddenLine xmlns="" xmlns:a14="http://schemas.microsoft.com/office/drawing/2010/main" w="9525">
+                  <a14:hiddenLine xmlns:a14="http://schemas.microsoft.com/office/drawing/2010/main" xmlns="" w="9525">
                     <a:solidFill>
                       <a:srgbClr val="000000"/>
                     </a:solidFill>
@@ -12320,7 +12324,7 @@
               </a:ln>
               <a:extLst>
                 <a:ext uri="{91240B29-F687-4f45-9708-019B960494DF}">
-                  <a14:hiddenLine xmlns="" xmlns:a14="http://schemas.microsoft.com/office/drawing/2010/main" w="9525">
+                  <a14:hiddenLine xmlns:a14="http://schemas.microsoft.com/office/drawing/2010/main" xmlns="" w="9525">
                     <a:solidFill>
                       <a:srgbClr val="000000"/>
                     </a:solidFill>
@@ -12435,7 +12439,7 @@
               </a:ln>
               <a:extLst>
                 <a:ext uri="{91240B29-F687-4f45-9708-019B960494DF}">
-                  <a14:hiddenLine xmlns="" xmlns:a14="http://schemas.microsoft.com/office/drawing/2010/main" w="9525">
+                  <a14:hiddenLine xmlns:a14="http://schemas.microsoft.com/office/drawing/2010/main" xmlns="" w="9525">
                     <a:solidFill>
                       <a:srgbClr val="000000"/>
                     </a:solidFill>
@@ -12525,7 +12529,7 @@
               </a:ln>
               <a:extLst>
                 <a:ext uri="{91240B29-F687-4f45-9708-019B960494DF}">
-                  <a14:hiddenLine xmlns="" xmlns:a14="http://schemas.microsoft.com/office/drawing/2010/main" w="9525">
+                  <a14:hiddenLine xmlns:a14="http://schemas.microsoft.com/office/drawing/2010/main" xmlns="" w="9525">
                     <a:solidFill>
                       <a:srgbClr val="000000"/>
                     </a:solidFill>
@@ -12590,7 +12594,7 @@
               </a:ln>
               <a:extLst>
                 <a:ext uri="{91240B29-F687-4f45-9708-019B960494DF}">
-                  <a14:hiddenLine xmlns="" xmlns:a14="http://schemas.microsoft.com/office/drawing/2010/main" w="9525">
+                  <a14:hiddenLine xmlns:a14="http://schemas.microsoft.com/office/drawing/2010/main" xmlns="" w="9525">
                     <a:solidFill>
                       <a:srgbClr val="000000"/>
                     </a:solidFill>
@@ -12680,7 +12684,7 @@
               </a:ln>
               <a:extLst>
                 <a:ext uri="{91240B29-F687-4f45-9708-019B960494DF}">
-                  <a14:hiddenLine xmlns="" xmlns:a14="http://schemas.microsoft.com/office/drawing/2010/main" w="9525">
+                  <a14:hiddenLine xmlns:a14="http://schemas.microsoft.com/office/drawing/2010/main" xmlns="" w="9525">
                     <a:solidFill>
                       <a:srgbClr val="000000"/>
                     </a:solidFill>
@@ -12748,7 +12752,7 @@
               </a:ln>
               <a:extLst>
                 <a:ext uri="{91240B29-F687-4f45-9708-019B960494DF}">
-                  <a14:hiddenLine xmlns="" xmlns:a14="http://schemas.microsoft.com/office/drawing/2010/main" w="9525">
+                  <a14:hiddenLine xmlns:a14="http://schemas.microsoft.com/office/drawing/2010/main" xmlns="" w="9525">
                     <a:solidFill>
                       <a:srgbClr val="000000"/>
                     </a:solidFill>
@@ -12838,7 +12842,7 @@
               </a:ln>
               <a:extLst>
                 <a:ext uri="{91240B29-F687-4f45-9708-019B960494DF}">
-                  <a14:hiddenLine xmlns="" xmlns:a14="http://schemas.microsoft.com/office/drawing/2010/main" w="9525">
+                  <a14:hiddenLine xmlns:a14="http://schemas.microsoft.com/office/drawing/2010/main" xmlns="" w="9525">
                     <a:solidFill>
                       <a:srgbClr val="000000"/>
                     </a:solidFill>
@@ -12906,7 +12910,7 @@
               </a:ln>
               <a:extLst>
                 <a:ext uri="{91240B29-F687-4f45-9708-019B960494DF}">
-                  <a14:hiddenLine xmlns="" xmlns:a14="http://schemas.microsoft.com/office/drawing/2010/main" w="9525">
+                  <a14:hiddenLine xmlns:a14="http://schemas.microsoft.com/office/drawing/2010/main" xmlns="" w="9525">
                     <a:solidFill>
                       <a:srgbClr val="000000"/>
                     </a:solidFill>
@@ -12996,7 +13000,7 @@
               </a:ln>
               <a:extLst>
                 <a:ext uri="{91240B29-F687-4f45-9708-019B960494DF}">
-                  <a14:hiddenLine xmlns="" xmlns:a14="http://schemas.microsoft.com/office/drawing/2010/main" w="9525">
+                  <a14:hiddenLine xmlns:a14="http://schemas.microsoft.com/office/drawing/2010/main" xmlns="" w="9525">
                     <a:solidFill>
                       <a:srgbClr val="000000"/>
                     </a:solidFill>
@@ -13030,7 +13034,7 @@
               </a:ln>
               <a:extLst>
                 <a:ext uri="{91240B29-F687-4f45-9708-019B960494DF}">
-                  <a14:hiddenLine xmlns="" xmlns:a14="http://schemas.microsoft.com/office/drawing/2010/main" w="9525">
+                  <a14:hiddenLine xmlns:a14="http://schemas.microsoft.com/office/drawing/2010/main" xmlns="" w="9525">
                     <a:solidFill>
                       <a:srgbClr val="000000"/>
                     </a:solidFill>
@@ -13663,6 +13667,89 @@
 </p:sld>
 </file>
 
+<file path=ppt/slides/slide10.xml><?xml version="1.0" encoding="utf-8"?>
+<p:sld xmlns:a="http://schemas.openxmlformats.org/drawingml/2006/main" xmlns:r="http://schemas.openxmlformats.org/officeDocument/2006/relationships" xmlns:p="http://schemas.openxmlformats.org/presentationml/2006/main">
+  <p:cSld>
+    <p:spTree>
+      <p:nvGrpSpPr>
+        <p:cNvPr id="1" name=""/>
+        <p:cNvGrpSpPr/>
+        <p:nvPr/>
+      </p:nvGrpSpPr>
+      <p:grpSpPr>
+        <a:xfrm>
+          <a:off x="0" y="0"/>
+          <a:ext cx="0" cy="0"/>
+          <a:chOff x="0" y="0"/>
+          <a:chExt cx="0" cy="0"/>
+        </a:xfrm>
+      </p:grpSpPr>
+      <p:sp>
+        <p:nvSpPr>
+          <p:cNvPr id="2" name="Title 1">
+            <a:extLst>
+              <a:ext uri="{FF2B5EF4-FFF2-40B4-BE49-F238E27FC236}">
+                <a16:creationId xmlns:a16="http://schemas.microsoft.com/office/drawing/2014/main" id="{A1FDBB2E-6496-97C0-B99C-AD2B20A9A13B}"/>
+              </a:ext>
+            </a:extLst>
+          </p:cNvPr>
+          <p:cNvSpPr>
+            <a:spLocks noGrp="1"/>
+          </p:cNvSpPr>
+          <p:nvPr>
+            <p:ph type="title"/>
+          </p:nvPr>
+        </p:nvSpPr>
+        <p:spPr/>
+        <p:txBody>
+          <a:bodyPr/>
+          <a:lstStyle/>
+          <a:p>
+            <a:r>
+              <a:rPr lang="en-US" dirty="0"/>
+              <a:t>Future Plans!</a:t>
+            </a:r>
+          </a:p>
+        </p:txBody>
+      </p:sp>
+      <p:sp>
+        <p:nvSpPr>
+          <p:cNvPr id="3" name="Content Placeholder 2">
+            <a:extLst>
+              <a:ext uri="{FF2B5EF4-FFF2-40B4-BE49-F238E27FC236}">
+                <a16:creationId xmlns:a16="http://schemas.microsoft.com/office/drawing/2014/main" id="{A8C78C33-059F-5657-C4C1-C8262AD3DE42}"/>
+              </a:ext>
+            </a:extLst>
+          </p:cNvPr>
+          <p:cNvSpPr>
+            <a:spLocks noGrp="1"/>
+          </p:cNvSpPr>
+          <p:nvPr>
+            <p:ph idx="1"/>
+          </p:nvPr>
+        </p:nvSpPr>
+        <p:spPr/>
+        <p:txBody>
+          <a:bodyPr/>
+          <a:lstStyle/>
+          <a:p>
+            <a:endParaRPr lang="en-US"/>
+          </a:p>
+        </p:txBody>
+      </p:sp>
+    </p:spTree>
+    <p:extLst>
+      <p:ext uri="{BB962C8B-B14F-4D97-AF65-F5344CB8AC3E}">
+        <p14:creationId xmlns:p14="http://schemas.microsoft.com/office/powerpoint/2010/main" val="1714005908"/>
+      </p:ext>
+    </p:extLst>
+  </p:cSld>
+  <p:clrMapOvr>
+    <a:masterClrMapping/>
+  </p:clrMapOvr>
+</p:sld>
+</file>
+
 <file path=ppt/slides/slide2.xml><?xml version="1.0" encoding="utf-8"?>
 <p:sld xmlns:a="http://schemas.openxmlformats.org/drawingml/2006/main" xmlns:r="http://schemas.openxmlformats.org/officeDocument/2006/relationships" xmlns:p="http://schemas.openxmlformats.org/presentationml/2006/main">
   <p:cSld>
@@ -13789,6 +13876,350 @@
           <p:cNvPr id="2" name="Title 1">
             <a:extLst>
               <a:ext uri="{FF2B5EF4-FFF2-40B4-BE49-F238E27FC236}">
+                <a16:creationId xmlns:a16="http://schemas.microsoft.com/office/drawing/2014/main" id="{FF2CA2E2-3148-7BFE-2E5F-E17499814ADD}"/>
+              </a:ext>
+            </a:extLst>
+          </p:cNvPr>
+          <p:cNvSpPr>
+            <a:spLocks noGrp="1"/>
+          </p:cNvSpPr>
+          <p:nvPr>
+            <p:ph type="title"/>
+          </p:nvPr>
+        </p:nvSpPr>
+        <p:spPr>
+          <a:xfrm>
+            <a:off x="1141413" y="609600"/>
+            <a:ext cx="5934508" cy="550333"/>
+          </a:xfrm>
+        </p:spPr>
+        <p:txBody>
+          <a:bodyPr/>
+          <a:lstStyle/>
+          <a:p>
+            <a:r>
+              <a:rPr lang="en-US" dirty="0"/>
+              <a:t>Code Snippets!</a:t>
+            </a:r>
+          </a:p>
+        </p:txBody>
+      </p:sp>
+      <p:sp>
+        <p:nvSpPr>
+          <p:cNvPr id="4" name="Text Placeholder 3">
+            <a:extLst>
+              <a:ext uri="{FF2B5EF4-FFF2-40B4-BE49-F238E27FC236}">
+                <a16:creationId xmlns:a16="http://schemas.microsoft.com/office/drawing/2014/main" id="{A9329B80-7C22-F9EB-45D9-584C1BB18759}"/>
+              </a:ext>
+            </a:extLst>
+          </p:cNvPr>
+          <p:cNvSpPr>
+            <a:spLocks noGrp="1"/>
+          </p:cNvSpPr>
+          <p:nvPr>
+            <p:ph type="body" sz="half" idx="2"/>
+          </p:nvPr>
+        </p:nvSpPr>
+        <p:spPr>
+          <a:xfrm>
+            <a:off x="1141410" y="1159933"/>
+            <a:ext cx="4057123" cy="4631267"/>
+          </a:xfrm>
+        </p:spPr>
+        <p:txBody>
+          <a:bodyPr>
+            <a:normAutofit lnSpcReduction="10000"/>
+          </a:bodyPr>
+          <a:lstStyle/>
+          <a:p>
+            <a:pPr marL="285750" indent="-285750">
+              <a:buFont typeface="Arial" panose="020B0604020202020204" pitchFamily="34" charset="0"/>
+              <a:buChar char="•"/>
+            </a:pPr>
+            <a:r>
+              <a:rPr lang="en-US" sz="2000" dirty="0"/>
+              <a:t>Code to the right shows two different methods</a:t>
+            </a:r>
+          </a:p>
+          <a:p>
+            <a:pPr marL="285750" indent="-285750">
+              <a:buFont typeface="Arial" panose="020B0604020202020204" pitchFamily="34" charset="0"/>
+              <a:buChar char="•"/>
+            </a:pPr>
+            <a:r>
+              <a:rPr lang="en-US" sz="2000" dirty="0"/>
+              <a:t>Theses methods do the same thing:</a:t>
+            </a:r>
+          </a:p>
+          <a:p>
+            <a:pPr marL="742950" lvl="1" indent="-285750">
+              <a:buFont typeface="Arial" panose="020B0604020202020204" pitchFamily="34" charset="0"/>
+              <a:buChar char="•"/>
+            </a:pPr>
+            <a:r>
+              <a:rPr lang="en-US" sz="1800" dirty="0"/>
+              <a:t>Pass a Prefab as a parameter.</a:t>
+            </a:r>
+          </a:p>
+          <a:p>
+            <a:pPr marL="742950" lvl="1" indent="-285750">
+              <a:buFont typeface="Arial" panose="020B0604020202020204" pitchFamily="34" charset="0"/>
+              <a:buChar char="•"/>
+            </a:pPr>
+            <a:r>
+              <a:rPr lang="en-US" sz="1800" dirty="0"/>
+              <a:t>Spawn the Prefab it the Boolean is false. It will then instantiate that object.</a:t>
+            </a:r>
+          </a:p>
+          <a:p>
+            <a:pPr marL="742950" lvl="1" indent="-285750">
+              <a:buFont typeface="Arial" panose="020B0604020202020204" pitchFamily="34" charset="0"/>
+              <a:buChar char="•"/>
+            </a:pPr>
+            <a:r>
+              <a:rPr lang="en-US" sz="1800" dirty="0"/>
+              <a:t>Then it will play an audio sound when the button is pressed.</a:t>
+            </a:r>
+          </a:p>
+          <a:p>
+            <a:pPr marL="285750" indent="-285750">
+              <a:buFont typeface="Arial" panose="020B0604020202020204" pitchFamily="34" charset="0"/>
+              <a:buChar char="•"/>
+            </a:pPr>
+            <a:r>
+              <a:rPr lang="en-US" sz="2000" dirty="0"/>
+              <a:t>If the Boolean is true nothing will happen as the object is already in the scene.</a:t>
+            </a:r>
+          </a:p>
+        </p:txBody>
+      </p:sp>
+      <p:pic>
+        <p:nvPicPr>
+          <p:cNvPr id="7" name="Picture 6">
+            <a:extLst>
+              <a:ext uri="{FF2B5EF4-FFF2-40B4-BE49-F238E27FC236}">
+                <a16:creationId xmlns:a16="http://schemas.microsoft.com/office/drawing/2014/main" id="{E82B12C8-7CB1-AB4F-5954-C4AEA2072659}"/>
+              </a:ext>
+            </a:extLst>
+          </p:cNvPr>
+          <p:cNvPicPr>
+            <a:picLocks noChangeAspect="1"/>
+          </p:cNvPicPr>
+          <p:nvPr/>
+        </p:nvPicPr>
+        <p:blipFill>
+          <a:blip r:embed="rId2"/>
+          <a:stretch>
+            <a:fillRect/>
+          </a:stretch>
+        </p:blipFill>
+        <p:spPr>
+          <a:xfrm>
+            <a:off x="5326056" y="609600"/>
+            <a:ext cx="6677235" cy="5181600"/>
+          </a:xfrm>
+          <a:prstGeom prst="rect">
+            <a:avLst/>
+          </a:prstGeom>
+        </p:spPr>
+      </p:pic>
+    </p:spTree>
+    <p:extLst>
+      <p:ext uri="{BB962C8B-B14F-4D97-AF65-F5344CB8AC3E}">
+        <p14:creationId xmlns:p14="http://schemas.microsoft.com/office/powerpoint/2010/main" val="2737887765"/>
+      </p:ext>
+    </p:extLst>
+  </p:cSld>
+  <p:clrMapOvr>
+    <a:masterClrMapping/>
+  </p:clrMapOvr>
+</p:sld>
+</file>
+
+<file path=ppt/slides/slide4.xml><?xml version="1.0" encoding="utf-8"?>
+<p:sld xmlns:a="http://schemas.openxmlformats.org/drawingml/2006/main" xmlns:r="http://schemas.openxmlformats.org/officeDocument/2006/relationships" xmlns:p="http://schemas.openxmlformats.org/presentationml/2006/main">
+  <p:cSld>
+    <p:spTree>
+      <p:nvGrpSpPr>
+        <p:cNvPr id="1" name=""/>
+        <p:cNvGrpSpPr/>
+        <p:nvPr/>
+      </p:nvGrpSpPr>
+      <p:grpSpPr>
+        <a:xfrm>
+          <a:off x="0" y="0"/>
+          <a:ext cx="0" cy="0"/>
+          <a:chOff x="0" y="0"/>
+          <a:chExt cx="0" cy="0"/>
+        </a:xfrm>
+      </p:grpSpPr>
+      <p:sp>
+        <p:nvSpPr>
+          <p:cNvPr id="2" name="Title 1">
+            <a:extLst>
+              <a:ext uri="{FF2B5EF4-FFF2-40B4-BE49-F238E27FC236}">
+                <a16:creationId xmlns:a16="http://schemas.microsoft.com/office/drawing/2014/main" id="{FF2CA2E2-3148-7BFE-2E5F-E17499814ADD}"/>
+              </a:ext>
+            </a:extLst>
+          </p:cNvPr>
+          <p:cNvSpPr>
+            <a:spLocks noGrp="1"/>
+          </p:cNvSpPr>
+          <p:nvPr>
+            <p:ph type="title"/>
+          </p:nvPr>
+        </p:nvSpPr>
+        <p:spPr>
+          <a:xfrm>
+            <a:off x="1141413" y="609600"/>
+            <a:ext cx="5934508" cy="550333"/>
+          </a:xfrm>
+        </p:spPr>
+        <p:txBody>
+          <a:bodyPr/>
+          <a:lstStyle/>
+          <a:p>
+            <a:r>
+              <a:rPr lang="en-US" dirty="0"/>
+              <a:t>Code Snippets!</a:t>
+            </a:r>
+          </a:p>
+        </p:txBody>
+      </p:sp>
+      <p:sp>
+        <p:nvSpPr>
+          <p:cNvPr id="4" name="Text Placeholder 3">
+            <a:extLst>
+              <a:ext uri="{FF2B5EF4-FFF2-40B4-BE49-F238E27FC236}">
+                <a16:creationId xmlns:a16="http://schemas.microsoft.com/office/drawing/2014/main" id="{A9329B80-7C22-F9EB-45D9-584C1BB18759}"/>
+              </a:ext>
+            </a:extLst>
+          </p:cNvPr>
+          <p:cNvSpPr>
+            <a:spLocks noGrp="1"/>
+          </p:cNvSpPr>
+          <p:nvPr>
+            <p:ph type="body" sz="half" idx="2"/>
+          </p:nvPr>
+        </p:nvSpPr>
+        <p:spPr>
+          <a:xfrm>
+            <a:off x="1141410" y="1159933"/>
+            <a:ext cx="4057123" cy="4631267"/>
+          </a:xfrm>
+        </p:spPr>
+        <p:txBody>
+          <a:bodyPr>
+            <a:normAutofit/>
+          </a:bodyPr>
+          <a:lstStyle/>
+          <a:p>
+            <a:pPr marL="285750" indent="-285750">
+              <a:buFont typeface="Arial" panose="020B0604020202020204" pitchFamily="34" charset="0"/>
+              <a:buChar char="•"/>
+            </a:pPr>
+            <a:r>
+              <a:rPr lang="en-US" sz="2000" dirty="0"/>
+              <a:t>Code to the right is used to keep the teleport tablet in a specific location.</a:t>
+            </a:r>
+          </a:p>
+          <a:p>
+            <a:pPr marL="285750" indent="-285750">
+              <a:buFont typeface="Arial" panose="020B0604020202020204" pitchFamily="34" charset="0"/>
+              <a:buChar char="•"/>
+            </a:pPr>
+            <a:r>
+              <a:rPr lang="en-US" sz="2000" dirty="0"/>
+              <a:t>This is need so the player does not lose the ability to travel between the main room and the build site.</a:t>
+            </a:r>
+          </a:p>
+          <a:p>
+            <a:pPr marL="285750" indent="-285750">
+              <a:buFont typeface="Arial" panose="020B0604020202020204" pitchFamily="34" charset="0"/>
+              <a:buChar char="•"/>
+            </a:pPr>
+            <a:r>
+              <a:rPr lang="en-US" sz="2000" dirty="0"/>
+              <a:t>All this script does is check to see if the Boolean isInSocket is false.</a:t>
+            </a:r>
+          </a:p>
+          <a:p>
+            <a:pPr marL="742950" lvl="1" indent="-285750">
+              <a:buFont typeface="Arial" panose="020B0604020202020204" pitchFamily="34" charset="0"/>
+              <a:buChar char="•"/>
+            </a:pPr>
+            <a:r>
+              <a:rPr lang="en-US" sz="1800" dirty="0"/>
+              <a:t>If the Boolean is false the tablet will teleport back to the socket it is attached to.</a:t>
+            </a:r>
+          </a:p>
+        </p:txBody>
+      </p:sp>
+      <p:pic>
+        <p:nvPicPr>
+          <p:cNvPr id="5" name="Picture 4">
+            <a:extLst>
+              <a:ext uri="{FF2B5EF4-FFF2-40B4-BE49-F238E27FC236}">
+                <a16:creationId xmlns:a16="http://schemas.microsoft.com/office/drawing/2014/main" id="{D60B5719-2C04-F4EE-2006-70B72CDE71F4}"/>
+              </a:ext>
+            </a:extLst>
+          </p:cNvPr>
+          <p:cNvPicPr>
+            <a:picLocks noChangeAspect="1"/>
+          </p:cNvPicPr>
+          <p:nvPr/>
+        </p:nvPicPr>
+        <p:blipFill>
+          <a:blip r:embed="rId2"/>
+          <a:stretch>
+            <a:fillRect/>
+          </a:stretch>
+        </p:blipFill>
+        <p:spPr>
+          <a:xfrm>
+            <a:off x="5746604" y="408824"/>
+            <a:ext cx="4829849" cy="5382376"/>
+          </a:xfrm>
+          <a:prstGeom prst="rect">
+            <a:avLst/>
+          </a:prstGeom>
+        </p:spPr>
+      </p:pic>
+    </p:spTree>
+    <p:extLst>
+      <p:ext uri="{BB962C8B-B14F-4D97-AF65-F5344CB8AC3E}">
+        <p14:creationId xmlns:p14="http://schemas.microsoft.com/office/powerpoint/2010/main" val="3916450128"/>
+      </p:ext>
+    </p:extLst>
+  </p:cSld>
+  <p:clrMapOvr>
+    <a:masterClrMapping/>
+  </p:clrMapOvr>
+</p:sld>
+</file>
+
+<file path=ppt/slides/slide5.xml><?xml version="1.0" encoding="utf-8"?>
+<p:sld xmlns:a="http://schemas.openxmlformats.org/drawingml/2006/main" xmlns:r="http://schemas.openxmlformats.org/officeDocument/2006/relationships" xmlns:p="http://schemas.openxmlformats.org/presentationml/2006/main">
+  <p:cSld>
+    <p:spTree>
+      <p:nvGrpSpPr>
+        <p:cNvPr id="1" name=""/>
+        <p:cNvGrpSpPr/>
+        <p:nvPr/>
+      </p:nvGrpSpPr>
+      <p:grpSpPr>
+        <a:xfrm>
+          <a:off x="0" y="0"/>
+          <a:ext cx="0" cy="0"/>
+          <a:chOff x="0" y="0"/>
+          <a:chExt cx="0" cy="0"/>
+        </a:xfrm>
+      </p:grpSpPr>
+      <p:sp>
+        <p:nvSpPr>
+          <p:cNvPr id="2" name="Title 1">
+            <a:extLst>
+              <a:ext uri="{FF2B5EF4-FFF2-40B4-BE49-F238E27FC236}">
                 <a16:creationId xmlns:a16="http://schemas.microsoft.com/office/drawing/2014/main" id="{8AEF906F-2E67-5EF8-0655-86EA8B317B23}"/>
               </a:ext>
             </a:extLst>
@@ -13814,10 +14245,10 @@
       </p:sp>
       <p:sp>
         <p:nvSpPr>
-          <p:cNvPr id="3" name="Content Placeholder 2">
+          <p:cNvPr id="7" name="Content Placeholder 6">
             <a:extLst>
               <a:ext uri="{FF2B5EF4-FFF2-40B4-BE49-F238E27FC236}">
-                <a16:creationId xmlns:a16="http://schemas.microsoft.com/office/drawing/2014/main" id="{E6574758-E285-F9E5-6646-C25DCC98C2AA}"/>
+                <a16:creationId xmlns:a16="http://schemas.microsoft.com/office/drawing/2014/main" id="{ACF5DBB0-63B4-5EA6-9D16-50CD1B2FB572}"/>
               </a:ext>
             </a:extLst>
           </p:cNvPr>
@@ -13830,10 +14261,42 @@
         </p:nvSpPr>
         <p:spPr/>
         <p:txBody>
-          <a:bodyPr/>
+          <a:bodyPr>
+            <a:normAutofit fontScale="92500" lnSpcReduction="10000"/>
+          </a:bodyPr>
           <a:lstStyle/>
           <a:p>
-            <a:endParaRPr lang="en-US"/>
+            <a:r>
+              <a:rPr lang="en-US" dirty="0">
+                <a:hlinkClick r:id="rId2" action="ppaction://hlinkfile"/>
+              </a:rPr>
+              <a:t>Building System</a:t>
+            </a:r>
+            <a:endParaRPr lang="en-US" dirty="0"/>
+          </a:p>
+          <a:p>
+            <a:r>
+              <a:rPr lang="en-US" dirty="0"/>
+              <a:t>This code is going to be used so players can place furniture or even models themselves. </a:t>
+            </a:r>
+          </a:p>
+          <a:p>
+            <a:r>
+              <a:rPr lang="en-US" dirty="0"/>
+              <a:t>I created this script in a normal 3D space because I wanted to mess around with it before I important it to VR.</a:t>
+            </a:r>
+          </a:p>
+          <a:p>
+            <a:r>
+              <a:rPr lang="en-US" dirty="0"/>
+              <a:t>I currently do not have it working for my VR game mainly because I do not know how I am going to go about implementing it.</a:t>
+            </a:r>
+          </a:p>
+          <a:p>
+            <a:r>
+              <a:rPr lang="en-US" dirty="0"/>
+              <a:t>Most likely, will have to do a little more research or even start it from scratch</a:t>
+            </a:r>
           </a:p>
         </p:txBody>
       </p:sp>
@@ -13850,7 +14313,221 @@
 </p:sld>
 </file>
 
-<file path=ppt/slides/slide4.xml><?xml version="1.0" encoding="utf-8"?>
+<file path=ppt/slides/slide6.xml><?xml version="1.0" encoding="utf-8"?>
+<p:sld xmlns:a="http://schemas.openxmlformats.org/drawingml/2006/main" xmlns:r="http://schemas.openxmlformats.org/officeDocument/2006/relationships" xmlns:p="http://schemas.openxmlformats.org/presentationml/2006/main">
+  <p:cSld>
+    <p:spTree>
+      <p:nvGrpSpPr>
+        <p:cNvPr id="1" name=""/>
+        <p:cNvGrpSpPr/>
+        <p:nvPr/>
+      </p:nvGrpSpPr>
+      <p:grpSpPr>
+        <a:xfrm>
+          <a:off x="0" y="0"/>
+          <a:ext cx="0" cy="0"/>
+          <a:chOff x="0" y="0"/>
+          <a:chExt cx="0" cy="0"/>
+        </a:xfrm>
+      </p:grpSpPr>
+      <p:sp>
+        <p:nvSpPr>
+          <p:cNvPr id="2" name="Title 1">
+            <a:extLst>
+              <a:ext uri="{FF2B5EF4-FFF2-40B4-BE49-F238E27FC236}">
+                <a16:creationId xmlns:a16="http://schemas.microsoft.com/office/drawing/2014/main" id="{BE926DC3-4513-C5CC-DAFA-FC9252096B2B}"/>
+              </a:ext>
+            </a:extLst>
+          </p:cNvPr>
+          <p:cNvSpPr>
+            <a:spLocks noGrp="1"/>
+          </p:cNvSpPr>
+          <p:nvPr>
+            <p:ph type="title"/>
+          </p:nvPr>
+        </p:nvSpPr>
+        <p:spPr>
+          <a:xfrm>
+            <a:off x="1141413" y="609600"/>
+            <a:ext cx="5934508" cy="558800"/>
+          </a:xfrm>
+        </p:spPr>
+        <p:txBody>
+          <a:bodyPr/>
+          <a:lstStyle/>
+          <a:p>
+            <a:r>
+              <a:rPr lang="en-US" dirty="0"/>
+              <a:t>Asset Creation!</a:t>
+            </a:r>
+          </a:p>
+        </p:txBody>
+      </p:sp>
+      <p:sp>
+        <p:nvSpPr>
+          <p:cNvPr id="4" name="Text Placeholder 3">
+            <a:extLst>
+              <a:ext uri="{FF2B5EF4-FFF2-40B4-BE49-F238E27FC236}">
+                <a16:creationId xmlns:a16="http://schemas.microsoft.com/office/drawing/2014/main" id="{E57BCE8C-B38A-D67D-7626-CD5C786FE045}"/>
+              </a:ext>
+            </a:extLst>
+          </p:cNvPr>
+          <p:cNvSpPr>
+            <a:spLocks noGrp="1"/>
+          </p:cNvSpPr>
+          <p:nvPr>
+            <p:ph type="body" sz="half" idx="2"/>
+          </p:nvPr>
+        </p:nvSpPr>
+        <p:spPr>
+          <a:xfrm>
+            <a:off x="1141410" y="1270000"/>
+            <a:ext cx="4632857" cy="3725333"/>
+          </a:xfrm>
+        </p:spPr>
+        <p:txBody>
+          <a:bodyPr>
+            <a:normAutofit lnSpcReduction="10000"/>
+          </a:bodyPr>
+          <a:lstStyle/>
+          <a:p>
+            <a:r>
+              <a:rPr lang="en-US" sz="2000" dirty="0"/>
+              <a:t>I created a total of three assets total this semester. These include:</a:t>
+            </a:r>
+          </a:p>
+          <a:p>
+            <a:pPr marL="800100" lvl="1" indent="-342900">
+              <a:buFont typeface="Arial" panose="020B0604020202020204" pitchFamily="34" charset="0"/>
+              <a:buChar char="•"/>
+            </a:pPr>
+            <a:r>
+              <a:rPr lang="en-US" sz="1800" dirty="0"/>
+              <a:t>The main hub where players will be interacting with models.</a:t>
+            </a:r>
+          </a:p>
+          <a:p>
+            <a:pPr marL="800100" lvl="1" indent="-342900">
+              <a:buFont typeface="Arial" panose="020B0604020202020204" pitchFamily="34" charset="0"/>
+              <a:buChar char="•"/>
+            </a:pPr>
+            <a:r>
+              <a:rPr lang="en-US" sz="1800" dirty="0"/>
+              <a:t>Two different single story house which will be used to place and walk through.</a:t>
+            </a:r>
+          </a:p>
+          <a:p>
+            <a:r>
+              <a:rPr lang="en-US" sz="2000" dirty="0"/>
+              <a:t>Each of the single story houses  have rooms that were modeled individually then combined into one Maya file to be textured.</a:t>
+            </a:r>
+          </a:p>
+        </p:txBody>
+      </p:sp>
+      <p:pic>
+        <p:nvPicPr>
+          <p:cNvPr id="8" name="Picture 7">
+            <a:extLst>
+              <a:ext uri="{FF2B5EF4-FFF2-40B4-BE49-F238E27FC236}">
+                <a16:creationId xmlns:a16="http://schemas.microsoft.com/office/drawing/2014/main" id="{20A06379-9203-37EC-F5C4-A96919101EFB}"/>
+              </a:ext>
+            </a:extLst>
+          </p:cNvPr>
+          <p:cNvPicPr>
+            <a:picLocks noChangeAspect="1"/>
+          </p:cNvPicPr>
+          <p:nvPr/>
+        </p:nvPicPr>
+        <p:blipFill>
+          <a:blip r:embed="rId2"/>
+          <a:stretch>
+            <a:fillRect/>
+          </a:stretch>
+        </p:blipFill>
+        <p:spPr>
+          <a:xfrm>
+            <a:off x="6194461" y="101600"/>
+            <a:ext cx="4632857" cy="3112053"/>
+          </a:xfrm>
+          <a:prstGeom prst="rect">
+            <a:avLst/>
+          </a:prstGeom>
+        </p:spPr>
+      </p:pic>
+      <p:pic>
+        <p:nvPicPr>
+          <p:cNvPr id="10" name="Picture 9">
+            <a:extLst>
+              <a:ext uri="{FF2B5EF4-FFF2-40B4-BE49-F238E27FC236}">
+                <a16:creationId xmlns:a16="http://schemas.microsoft.com/office/drawing/2014/main" id="{38D23665-8D1C-B40E-CB41-77606CFD197C}"/>
+              </a:ext>
+            </a:extLst>
+          </p:cNvPr>
+          <p:cNvPicPr>
+            <a:picLocks noChangeAspect="1"/>
+          </p:cNvPicPr>
+          <p:nvPr/>
+        </p:nvPicPr>
+        <p:blipFill>
+          <a:blip r:embed="rId3"/>
+          <a:stretch>
+            <a:fillRect/>
+          </a:stretch>
+        </p:blipFill>
+        <p:spPr>
+          <a:xfrm>
+            <a:off x="6194461" y="3297739"/>
+            <a:ext cx="4632858" cy="3259117"/>
+          </a:xfrm>
+          <a:prstGeom prst="rect">
+            <a:avLst/>
+          </a:prstGeom>
+        </p:spPr>
+      </p:pic>
+      <p:pic>
+        <p:nvPicPr>
+          <p:cNvPr id="12" name="Picture 11">
+            <a:extLst>
+              <a:ext uri="{FF2B5EF4-FFF2-40B4-BE49-F238E27FC236}">
+                <a16:creationId xmlns:a16="http://schemas.microsoft.com/office/drawing/2014/main" id="{42DF760D-86E3-3301-F381-1ABDB5964B5B}"/>
+              </a:ext>
+            </a:extLst>
+          </p:cNvPr>
+          <p:cNvPicPr>
+            <a:picLocks noChangeAspect="1"/>
+          </p:cNvPicPr>
+          <p:nvPr/>
+        </p:nvPicPr>
+        <p:blipFill>
+          <a:blip r:embed="rId4"/>
+          <a:stretch>
+            <a:fillRect/>
+          </a:stretch>
+        </p:blipFill>
+        <p:spPr>
+          <a:xfrm>
+            <a:off x="2737590" y="4584123"/>
+            <a:ext cx="2926610" cy="1972733"/>
+          </a:xfrm>
+          <a:prstGeom prst="rect">
+            <a:avLst/>
+          </a:prstGeom>
+        </p:spPr>
+      </p:pic>
+    </p:spTree>
+    <p:extLst>
+      <p:ext uri="{BB962C8B-B14F-4D97-AF65-F5344CB8AC3E}">
+        <p14:creationId xmlns:p14="http://schemas.microsoft.com/office/powerpoint/2010/main" val="2220145573"/>
+      </p:ext>
+    </p:extLst>
+  </p:cSld>
+  <p:clrMapOvr>
+    <a:masterClrMapping/>
+  </p:clrMapOvr>
+</p:sld>
+</file>
+
+<file path=ppt/slides/slide7.xml><?xml version="1.0" encoding="utf-8"?>
 <p:sld xmlns:a="http://schemas.openxmlformats.org/drawingml/2006/main" xmlns:r="http://schemas.openxmlformats.org/officeDocument/2006/relationships" xmlns:p="http://schemas.openxmlformats.org/presentationml/2006/main">
   <p:cSld>
     <p:spTree>
@@ -14008,7 +14685,7 @@
 </p:sld>
 </file>
 
-<file path=ppt/slides/slide5.xml><?xml version="1.0" encoding="utf-8"?>
+<file path=ppt/slides/slide8.xml><?xml version="1.0" encoding="utf-8"?>
 <p:sld xmlns:a="http://schemas.openxmlformats.org/drawingml/2006/main" xmlns:r="http://schemas.openxmlformats.org/officeDocument/2006/relationships" xmlns:p="http://schemas.openxmlformats.org/presentationml/2006/main">
   <p:cSld>
     <p:spTree>
@@ -14317,7 +14994,7 @@
 </p:sld>
 </file>
 
-<file path=ppt/slides/slide6.xml><?xml version="1.0" encoding="utf-8"?>
+<file path=ppt/slides/slide9.xml><?xml version="1.0" encoding="utf-8"?>
 <p:sld xmlns:a="http://schemas.openxmlformats.org/drawingml/2006/main" xmlns:r="http://schemas.openxmlformats.org/officeDocument/2006/relationships" xmlns:p="http://schemas.openxmlformats.org/presentationml/2006/main">
   <p:cSld>
     <p:spTree>
@@ -14357,7 +15034,7 @@
           <a:p>
             <a:r>
               <a:rPr lang="en-US" dirty="0"/>
-              <a:t>Walk through!</a:t>
+              <a:t>Game Demo!</a:t>
             </a:r>
           </a:p>
         </p:txBody>

</xml_diff>